<commit_message>
Updating at end of semester
</commit_message>
<xml_diff>
--- a/Thermo 2022 (Neshyba)/Lectures/Week 6 - 1st Law/Week 6.3 (Thursday) Carnot.pptx
+++ b/Thermo 2022 (Neshyba)/Lectures/Week 6 - 1st Law/Week 6.3 (Thursday) Carnot.pptx
@@ -264,7 +264,7 @@
           <a:p>
             <a:fld id="{360BB814-64FE-A046-86EF-08998BAE6296}" type="datetimeFigureOut">
               <a:rPr lang="en-US" smtClean="0"/>
-              <a:t>10/7/21</a:t>
+              <a:t>10/7/22</a:t>
             </a:fld>
             <a:endParaRPr lang="en-US"/>
           </a:p>
@@ -462,7 +462,7 @@
           <a:p>
             <a:fld id="{360BB814-64FE-A046-86EF-08998BAE6296}" type="datetimeFigureOut">
               <a:rPr lang="en-US" smtClean="0"/>
-              <a:t>10/7/21</a:t>
+              <a:t>10/7/22</a:t>
             </a:fld>
             <a:endParaRPr lang="en-US"/>
           </a:p>
@@ -670,7 +670,7 @@
           <a:p>
             <a:fld id="{360BB814-64FE-A046-86EF-08998BAE6296}" type="datetimeFigureOut">
               <a:rPr lang="en-US" smtClean="0"/>
-              <a:t>10/7/21</a:t>
+              <a:t>10/7/22</a:t>
             </a:fld>
             <a:endParaRPr lang="en-US"/>
           </a:p>
@@ -868,7 +868,7 @@
           <a:p>
             <a:fld id="{360BB814-64FE-A046-86EF-08998BAE6296}" type="datetimeFigureOut">
               <a:rPr lang="en-US" smtClean="0"/>
-              <a:t>10/7/21</a:t>
+              <a:t>10/7/22</a:t>
             </a:fld>
             <a:endParaRPr lang="en-US"/>
           </a:p>
@@ -1143,7 +1143,7 @@
           <a:p>
             <a:fld id="{360BB814-64FE-A046-86EF-08998BAE6296}" type="datetimeFigureOut">
               <a:rPr lang="en-US" smtClean="0"/>
-              <a:t>10/7/21</a:t>
+              <a:t>10/7/22</a:t>
             </a:fld>
             <a:endParaRPr lang="en-US"/>
           </a:p>
@@ -1408,7 +1408,7 @@
           <a:p>
             <a:fld id="{360BB814-64FE-A046-86EF-08998BAE6296}" type="datetimeFigureOut">
               <a:rPr lang="en-US" smtClean="0"/>
-              <a:t>10/7/21</a:t>
+              <a:t>10/7/22</a:t>
             </a:fld>
             <a:endParaRPr lang="en-US"/>
           </a:p>
@@ -1820,7 +1820,7 @@
           <a:p>
             <a:fld id="{360BB814-64FE-A046-86EF-08998BAE6296}" type="datetimeFigureOut">
               <a:rPr lang="en-US" smtClean="0"/>
-              <a:t>10/7/21</a:t>
+              <a:t>10/7/22</a:t>
             </a:fld>
             <a:endParaRPr lang="en-US"/>
           </a:p>
@@ -1961,7 +1961,7 @@
           <a:p>
             <a:fld id="{360BB814-64FE-A046-86EF-08998BAE6296}" type="datetimeFigureOut">
               <a:rPr lang="en-US" smtClean="0"/>
-              <a:t>10/7/21</a:t>
+              <a:t>10/7/22</a:t>
             </a:fld>
             <a:endParaRPr lang="en-US"/>
           </a:p>
@@ -2074,7 +2074,7 @@
           <a:p>
             <a:fld id="{360BB814-64FE-A046-86EF-08998BAE6296}" type="datetimeFigureOut">
               <a:rPr lang="en-US" smtClean="0"/>
-              <a:t>10/7/21</a:t>
+              <a:t>10/7/22</a:t>
             </a:fld>
             <a:endParaRPr lang="en-US"/>
           </a:p>
@@ -2385,7 +2385,7 @@
           <a:p>
             <a:fld id="{360BB814-64FE-A046-86EF-08998BAE6296}" type="datetimeFigureOut">
               <a:rPr lang="en-US" smtClean="0"/>
-              <a:t>10/7/21</a:t>
+              <a:t>10/7/22</a:t>
             </a:fld>
             <a:endParaRPr lang="en-US"/>
           </a:p>
@@ -2673,7 +2673,7 @@
           <a:p>
             <a:fld id="{360BB814-64FE-A046-86EF-08998BAE6296}" type="datetimeFigureOut">
               <a:rPr lang="en-US" smtClean="0"/>
-              <a:t>10/7/21</a:t>
+              <a:t>10/7/22</a:t>
             </a:fld>
             <a:endParaRPr lang="en-US"/>
           </a:p>
@@ -2914,7 +2914,7 @@
           <a:p>
             <a:fld id="{360BB814-64FE-A046-86EF-08998BAE6296}" type="datetimeFigureOut">
               <a:rPr lang="en-US" smtClean="0"/>
-              <a:t>10/7/21</a:t>
+              <a:t>10/7/22</a:t>
             </a:fld>
             <a:endParaRPr lang="en-US"/>
           </a:p>
@@ -3345,13 +3345,15 @@
         </p:nvSpPr>
         <p:spPr>
           <a:xfrm>
-            <a:off x="123443" y="189298"/>
+            <a:off x="0" y="0"/>
             <a:ext cx="11527184" cy="461665"/>
           </a:xfrm>
           <a:prstGeom prst="rect">
             <a:avLst/>
           </a:prstGeom>
-          <a:noFill/>
+          <a:solidFill>
+            <a:schemeClr val="accent2"/>
+          </a:solidFill>
         </p:spPr>
         <p:txBody>
           <a:bodyPr wrap="square" rtlCol="0">
@@ -3426,43 +3428,8 @@
           <a:chExt cx="0" cy="0"/>
         </a:xfrm>
       </p:grpSpPr>
-      <p:sp>
-        <p:nvSpPr>
-          <p:cNvPr id="10" name="TextBox 9">
-            <a:extLst>
-              <a:ext uri="{FF2B5EF4-FFF2-40B4-BE49-F238E27FC236}">
-                <a16:creationId xmlns:a16="http://schemas.microsoft.com/office/drawing/2014/main" id="{2C4D51AB-942B-FC45-BC1E-A73EAE9C61BD}"/>
-              </a:ext>
-            </a:extLst>
-          </p:cNvPr>
-          <p:cNvSpPr txBox="1"/>
-          <p:nvPr/>
-        </p:nvSpPr>
-        <p:spPr>
-          <a:xfrm>
-            <a:off x="123443" y="189298"/>
-            <a:ext cx="11527184" cy="461665"/>
-          </a:xfrm>
-          <a:prstGeom prst="rect">
-            <a:avLst/>
-          </a:prstGeom>
-          <a:noFill/>
-        </p:spPr>
-        <p:txBody>
-          <a:bodyPr wrap="square" rtlCol="0">
-            <a:spAutoFit/>
-          </a:bodyPr>
-          <a:lstStyle/>
-          <a:p>
-            <a:r>
-              <a:rPr lang="en-US" sz="2400" b="1" dirty="0"/>
-              <a:t>Carnot cycle is a theoretical heat engine</a:t>
-            </a:r>
-          </a:p>
-        </p:txBody>
-      </p:sp>
-      <mc:AlternateContent xmlns:mc="http://schemas.openxmlformats.org/markup-compatibility/2006">
-        <mc:Choice xmlns:a14="http://schemas.microsoft.com/office/drawing/2010/main" Requires="a14">
+      <mc:AlternateContent xmlns:mc="http://schemas.openxmlformats.org/markup-compatibility/2006" xmlns:a14="http://schemas.microsoft.com/office/drawing/2010/main">
+        <mc:Choice Requires="a14">
           <p:sp>
             <p:nvSpPr>
               <p:cNvPr id="52" name="TextBox 51">
@@ -3812,7 +3779,7 @@
             </p:txBody>
           </p:sp>
         </mc:Choice>
-        <mc:Fallback>
+        <mc:Fallback xmlns="">
           <p:sp>
             <p:nvSpPr>
               <p:cNvPr id="52" name="TextBox 51">
@@ -4364,6 +4331,43 @@
           </mc:Fallback>
         </mc:AlternateContent>
       </p:grpSp>
+      <p:sp>
+        <p:nvSpPr>
+          <p:cNvPr id="5" name="TextBox 4">
+            <a:extLst>
+              <a:ext uri="{FF2B5EF4-FFF2-40B4-BE49-F238E27FC236}">
+                <a16:creationId xmlns:a16="http://schemas.microsoft.com/office/drawing/2014/main" id="{9BA16ADA-CE02-6315-9DDA-E32689BDB7C3}"/>
+              </a:ext>
+            </a:extLst>
+          </p:cNvPr>
+          <p:cNvSpPr txBox="1"/>
+          <p:nvPr/>
+        </p:nvSpPr>
+        <p:spPr>
+          <a:xfrm>
+            <a:off x="0" y="0"/>
+            <a:ext cx="11527184" cy="461665"/>
+          </a:xfrm>
+          <a:prstGeom prst="rect">
+            <a:avLst/>
+          </a:prstGeom>
+          <a:solidFill>
+            <a:schemeClr val="accent2"/>
+          </a:solidFill>
+        </p:spPr>
+        <p:txBody>
+          <a:bodyPr wrap="square" rtlCol="0">
+            <a:spAutoFit/>
+          </a:bodyPr>
+          <a:lstStyle/>
+          <a:p>
+            <a:r>
+              <a:rPr lang="en-US" sz="2400" b="1" dirty="0"/>
+              <a:t>Thermal power generators (in Thermo, “heat engines”)</a:t>
+            </a:r>
+          </a:p>
+        </p:txBody>
+      </p:sp>
     </p:spTree>
     <p:extLst>
       <p:ext uri="{BB962C8B-B14F-4D97-AF65-F5344CB8AC3E}">
@@ -4394,41 +4398,6 @@
           <a:chExt cx="0" cy="0"/>
         </a:xfrm>
       </p:grpSpPr>
-      <p:sp>
-        <p:nvSpPr>
-          <p:cNvPr id="10" name="TextBox 9">
-            <a:extLst>
-              <a:ext uri="{FF2B5EF4-FFF2-40B4-BE49-F238E27FC236}">
-                <a16:creationId xmlns:a16="http://schemas.microsoft.com/office/drawing/2014/main" id="{2C4D51AB-942B-FC45-BC1E-A73EAE9C61BD}"/>
-              </a:ext>
-            </a:extLst>
-          </p:cNvPr>
-          <p:cNvSpPr txBox="1"/>
-          <p:nvPr/>
-        </p:nvSpPr>
-        <p:spPr>
-          <a:xfrm>
-            <a:off x="123443" y="189298"/>
-            <a:ext cx="11527184" cy="461665"/>
-          </a:xfrm>
-          <a:prstGeom prst="rect">
-            <a:avLst/>
-          </a:prstGeom>
-          <a:noFill/>
-        </p:spPr>
-        <p:txBody>
-          <a:bodyPr wrap="square" rtlCol="0">
-            <a:spAutoFit/>
-          </a:bodyPr>
-          <a:lstStyle/>
-          <a:p>
-            <a:r>
-              <a:rPr lang="en-US" sz="2400" b="1" dirty="0"/>
-              <a:t>Carnot cycle is a theoretical heat engine</a:t>
-            </a:r>
-          </a:p>
-        </p:txBody>
-      </p:sp>
       <p:sp>
         <p:nvSpPr>
           <p:cNvPr id="52" name="TextBox 51">
@@ -4514,8 +4483,8 @@
             </a:prstGeom>
           </p:spPr>
         </p:pic>
-        <mc:AlternateContent xmlns:mc="http://schemas.openxmlformats.org/markup-compatibility/2006">
-          <mc:Choice xmlns:a14="http://schemas.microsoft.com/office/drawing/2010/main" Requires="a14">
+        <mc:AlternateContent xmlns:mc="http://schemas.openxmlformats.org/markup-compatibility/2006" xmlns:a14="http://schemas.microsoft.com/office/drawing/2010/main">
+          <mc:Choice Requires="a14">
             <p:sp>
               <p:nvSpPr>
                 <p:cNvPr id="3" name="Rectangle 2">
@@ -4583,7 +4552,7 @@
               </p:txBody>
             </p:sp>
           </mc:Choice>
-          <mc:Fallback>
+          <mc:Fallback xmlns="">
             <p:sp>
               <p:nvSpPr>
                 <p:cNvPr id="3" name="Rectangle 2">
@@ -4628,8 +4597,8 @@
             </p:sp>
           </mc:Fallback>
         </mc:AlternateContent>
-        <mc:AlternateContent xmlns:mc="http://schemas.openxmlformats.org/markup-compatibility/2006">
-          <mc:Choice xmlns:a14="http://schemas.microsoft.com/office/drawing/2010/main" Requires="a14">
+        <mc:AlternateContent xmlns:mc="http://schemas.openxmlformats.org/markup-compatibility/2006" xmlns:a14="http://schemas.microsoft.com/office/drawing/2010/main">
+          <mc:Choice Requires="a14">
             <p:sp>
               <p:nvSpPr>
                 <p:cNvPr id="54" name="Rectangle 53">
@@ -4703,7 +4672,7 @@
               </p:txBody>
             </p:sp>
           </mc:Choice>
-          <mc:Fallback>
+          <mc:Fallback xmlns="">
             <p:sp>
               <p:nvSpPr>
                 <p:cNvPr id="54" name="Rectangle 53">
@@ -4748,8 +4717,8 @@
             </p:sp>
           </mc:Fallback>
         </mc:AlternateContent>
-        <mc:AlternateContent xmlns:mc="http://schemas.openxmlformats.org/markup-compatibility/2006">
-          <mc:Choice xmlns:a14="http://schemas.microsoft.com/office/drawing/2010/main" Requires="a14">
+        <mc:AlternateContent xmlns:mc="http://schemas.openxmlformats.org/markup-compatibility/2006" xmlns:a14="http://schemas.microsoft.com/office/drawing/2010/main">
+          <mc:Choice Requires="a14">
             <p:sp>
               <p:nvSpPr>
                 <p:cNvPr id="55" name="Rectangle 54">
@@ -4817,7 +4786,7 @@
               </p:txBody>
             </p:sp>
           </mc:Choice>
-          <mc:Fallback>
+          <mc:Fallback xmlns="">
             <p:sp>
               <p:nvSpPr>
                 <p:cNvPr id="55" name="Rectangle 54">
@@ -4862,8 +4831,8 @@
             </p:sp>
           </mc:Fallback>
         </mc:AlternateContent>
-        <mc:AlternateContent xmlns:mc="http://schemas.openxmlformats.org/markup-compatibility/2006">
-          <mc:Choice xmlns:a14="http://schemas.microsoft.com/office/drawing/2010/main" Requires="a14">
+        <mc:AlternateContent xmlns:mc="http://schemas.openxmlformats.org/markup-compatibility/2006" xmlns:a14="http://schemas.microsoft.com/office/drawing/2010/main">
+          <mc:Choice Requires="a14">
             <p:sp>
               <p:nvSpPr>
                 <p:cNvPr id="56" name="Rectangle 55">
@@ -4937,7 +4906,7 @@
               </p:txBody>
             </p:sp>
           </mc:Choice>
-          <mc:Fallback>
+          <mc:Fallback xmlns="">
             <p:sp>
               <p:nvSpPr>
                 <p:cNvPr id="56" name="Rectangle 55">
@@ -4983,6 +4952,43 @@
           </mc:Fallback>
         </mc:AlternateContent>
       </p:grpSp>
+      <p:sp>
+        <p:nvSpPr>
+          <p:cNvPr id="5" name="TextBox 4">
+            <a:extLst>
+              <a:ext uri="{FF2B5EF4-FFF2-40B4-BE49-F238E27FC236}">
+                <a16:creationId xmlns:a16="http://schemas.microsoft.com/office/drawing/2014/main" id="{28894FF9-4B81-BEC8-8ACA-79FA1FEBC1C6}"/>
+              </a:ext>
+            </a:extLst>
+          </p:cNvPr>
+          <p:cNvSpPr txBox="1"/>
+          <p:nvPr/>
+        </p:nvSpPr>
+        <p:spPr>
+          <a:xfrm>
+            <a:off x="0" y="0"/>
+            <a:ext cx="11527184" cy="461665"/>
+          </a:xfrm>
+          <a:prstGeom prst="rect">
+            <a:avLst/>
+          </a:prstGeom>
+          <a:solidFill>
+            <a:schemeClr val="accent2"/>
+          </a:solidFill>
+        </p:spPr>
+        <p:txBody>
+          <a:bodyPr wrap="square" rtlCol="0">
+            <a:spAutoFit/>
+          </a:bodyPr>
+          <a:lstStyle/>
+          <a:p>
+            <a:r>
+              <a:rPr lang="en-US" sz="2400" b="1" dirty="0"/>
+              <a:t>Thermal power generators (in Thermo, “heat engines”)</a:t>
+            </a:r>
+          </a:p>
+        </p:txBody>
+      </p:sp>
     </p:spTree>
     <p:extLst>
       <p:ext uri="{BB962C8B-B14F-4D97-AF65-F5344CB8AC3E}">
@@ -5013,43 +5019,8 @@
           <a:chExt cx="0" cy="0"/>
         </a:xfrm>
       </p:grpSpPr>
-      <p:sp>
-        <p:nvSpPr>
-          <p:cNvPr id="10" name="TextBox 9">
-            <a:extLst>
-              <a:ext uri="{FF2B5EF4-FFF2-40B4-BE49-F238E27FC236}">
-                <a16:creationId xmlns:a16="http://schemas.microsoft.com/office/drawing/2014/main" id="{2C4D51AB-942B-FC45-BC1E-A73EAE9C61BD}"/>
-              </a:ext>
-            </a:extLst>
-          </p:cNvPr>
-          <p:cNvSpPr txBox="1"/>
-          <p:nvPr/>
-        </p:nvSpPr>
-        <p:spPr>
-          <a:xfrm>
-            <a:off x="123443" y="189298"/>
-            <a:ext cx="11527184" cy="461665"/>
-          </a:xfrm>
-          <a:prstGeom prst="rect">
-            <a:avLst/>
-          </a:prstGeom>
-          <a:noFill/>
-        </p:spPr>
-        <p:txBody>
-          <a:bodyPr wrap="square" rtlCol="0">
-            <a:spAutoFit/>
-          </a:bodyPr>
-          <a:lstStyle/>
-          <a:p>
-            <a:r>
-              <a:rPr lang="en-US" sz="2400" b="1" dirty="0"/>
-              <a:t>Carnot cycle is a theoretical heat engine</a:t>
-            </a:r>
-          </a:p>
-        </p:txBody>
-      </p:sp>
-      <mc:AlternateContent xmlns:mc="http://schemas.openxmlformats.org/markup-compatibility/2006">
-        <mc:Choice xmlns:a14="http://schemas.microsoft.com/office/drawing/2010/main" Requires="a14">
+      <mc:AlternateContent xmlns:mc="http://schemas.openxmlformats.org/markup-compatibility/2006" xmlns:a14="http://schemas.microsoft.com/office/drawing/2010/main">
+        <mc:Choice Requires="a14">
           <p:sp>
             <p:nvSpPr>
               <p:cNvPr id="52" name="TextBox 51">
@@ -5092,6 +5063,7 @@
                 </a:endParaRPr>
               </a:p>
               <a:p>
+                <a:pPr/>
                 <a14:m>
                   <m:oMathPara xmlns:m="http://schemas.openxmlformats.org/officeDocument/2006/math">
                     <m:oMathParaPr>
@@ -5156,18 +5128,7 @@
                                 <a:srgbClr val="7030A0"/>
                               </a:solidFill>
                             </a:rPr>
-                            <m:t> </m:t>
-                          </m:r>
-                          <m:r>
-                            <m:rPr>
-                              <m:nor/>
-                            </m:rPr>
-                            <a:rPr lang="en-US" sz="2400" b="1" dirty="0">
-                              <a:solidFill>
-                                <a:srgbClr val="7030A0"/>
-                              </a:solidFill>
-                            </a:rPr>
-                            <m:t>=</m:t>
+                            <m:t> =</m:t>
                           </m:r>
                           <m:r>
                             <a:rPr lang="en-US" sz="2400" b="1" i="1">
@@ -5255,7 +5216,7 @@
             </p:txBody>
           </p:sp>
         </mc:Choice>
-        <mc:Fallback>
+        <mc:Fallback xmlns="">
           <p:sp>
             <p:nvSpPr>
               <p:cNvPr id="52" name="TextBox 51">
@@ -5409,6 +5370,43 @@
           </a:prstGeom>
         </p:spPr>
       </p:pic>
+      <p:sp>
+        <p:nvSpPr>
+          <p:cNvPr id="2" name="TextBox 1">
+            <a:extLst>
+              <a:ext uri="{FF2B5EF4-FFF2-40B4-BE49-F238E27FC236}">
+                <a16:creationId xmlns:a16="http://schemas.microsoft.com/office/drawing/2014/main" id="{D5384CA0-5260-BC16-401F-6FAFC348B051}"/>
+              </a:ext>
+            </a:extLst>
+          </p:cNvPr>
+          <p:cNvSpPr txBox="1"/>
+          <p:nvPr/>
+        </p:nvSpPr>
+        <p:spPr>
+          <a:xfrm>
+            <a:off x="0" y="0"/>
+            <a:ext cx="11527184" cy="461665"/>
+          </a:xfrm>
+          <a:prstGeom prst="rect">
+            <a:avLst/>
+          </a:prstGeom>
+          <a:solidFill>
+            <a:schemeClr val="accent2"/>
+          </a:solidFill>
+        </p:spPr>
+        <p:txBody>
+          <a:bodyPr wrap="square" rtlCol="0">
+            <a:spAutoFit/>
+          </a:bodyPr>
+          <a:lstStyle/>
+          <a:p>
+            <a:r>
+              <a:rPr lang="en-US" sz="2400" b="1" dirty="0"/>
+              <a:t>Thermal power generators (in Thermo, “heat engines”)</a:t>
+            </a:r>
+          </a:p>
+        </p:txBody>
+      </p:sp>
     </p:spTree>
     <p:extLst>
       <p:ext uri="{BB962C8B-B14F-4D97-AF65-F5344CB8AC3E}">
@@ -5439,43 +5437,8 @@
           <a:chExt cx="0" cy="0"/>
         </a:xfrm>
       </p:grpSpPr>
-      <p:sp>
-        <p:nvSpPr>
-          <p:cNvPr id="10" name="TextBox 9">
-            <a:extLst>
-              <a:ext uri="{FF2B5EF4-FFF2-40B4-BE49-F238E27FC236}">
-                <a16:creationId xmlns:a16="http://schemas.microsoft.com/office/drawing/2014/main" id="{2C4D51AB-942B-FC45-BC1E-A73EAE9C61BD}"/>
-              </a:ext>
-            </a:extLst>
-          </p:cNvPr>
-          <p:cNvSpPr txBox="1"/>
-          <p:nvPr/>
-        </p:nvSpPr>
-        <p:spPr>
-          <a:xfrm>
-            <a:off x="123443" y="189298"/>
-            <a:ext cx="11527184" cy="461665"/>
-          </a:xfrm>
-          <a:prstGeom prst="rect">
-            <a:avLst/>
-          </a:prstGeom>
-          <a:noFill/>
-        </p:spPr>
-        <p:txBody>
-          <a:bodyPr wrap="square" rtlCol="0">
-            <a:spAutoFit/>
-          </a:bodyPr>
-          <a:lstStyle/>
-          <a:p>
-            <a:r>
-              <a:rPr lang="en-US" sz="2400" b="1" dirty="0"/>
-              <a:t>Carnot cycle is a theoretical heat engine</a:t>
-            </a:r>
-          </a:p>
-        </p:txBody>
-      </p:sp>
-      <mc:AlternateContent xmlns:mc="http://schemas.openxmlformats.org/markup-compatibility/2006">
-        <mc:Choice xmlns:a14="http://schemas.microsoft.com/office/drawing/2010/main" Requires="a14">
+      <mc:AlternateContent xmlns:mc="http://schemas.openxmlformats.org/markup-compatibility/2006" xmlns:a14="http://schemas.microsoft.com/office/drawing/2010/main">
+        <mc:Choice Requires="a14">
           <p:sp>
             <p:nvSpPr>
               <p:cNvPr id="52" name="TextBox 51">
@@ -5890,7 +5853,7 @@
             </p:txBody>
           </p:sp>
         </mc:Choice>
-        <mc:Fallback>
+        <mc:Fallback xmlns="">
           <p:sp>
             <p:nvSpPr>
               <p:cNvPr id="52" name="TextBox 51">
@@ -5985,8 +5948,8 @@
             </a:prstGeom>
           </p:spPr>
         </p:pic>
-        <mc:AlternateContent xmlns:mc="http://schemas.openxmlformats.org/markup-compatibility/2006">
-          <mc:Choice xmlns:a14="http://schemas.microsoft.com/office/drawing/2010/main" Requires="a14">
+        <mc:AlternateContent xmlns:mc="http://schemas.openxmlformats.org/markup-compatibility/2006" xmlns:a14="http://schemas.microsoft.com/office/drawing/2010/main">
+          <mc:Choice Requires="a14">
             <p:sp>
               <p:nvSpPr>
                 <p:cNvPr id="3" name="Rectangle 2">
@@ -6054,7 +6017,7 @@
               </p:txBody>
             </p:sp>
           </mc:Choice>
-          <mc:Fallback>
+          <mc:Fallback xmlns="">
             <p:sp>
               <p:nvSpPr>
                 <p:cNvPr id="3" name="Rectangle 2">
@@ -6099,8 +6062,8 @@
             </p:sp>
           </mc:Fallback>
         </mc:AlternateContent>
-        <mc:AlternateContent xmlns:mc="http://schemas.openxmlformats.org/markup-compatibility/2006">
-          <mc:Choice xmlns:a14="http://schemas.microsoft.com/office/drawing/2010/main" Requires="a14">
+        <mc:AlternateContent xmlns:mc="http://schemas.openxmlformats.org/markup-compatibility/2006" xmlns:a14="http://schemas.microsoft.com/office/drawing/2010/main">
+          <mc:Choice Requires="a14">
             <p:sp>
               <p:nvSpPr>
                 <p:cNvPr id="54" name="Rectangle 53">
@@ -6174,7 +6137,7 @@
               </p:txBody>
             </p:sp>
           </mc:Choice>
-          <mc:Fallback>
+          <mc:Fallback xmlns="">
             <p:sp>
               <p:nvSpPr>
                 <p:cNvPr id="54" name="Rectangle 53">
@@ -6219,8 +6182,8 @@
             </p:sp>
           </mc:Fallback>
         </mc:AlternateContent>
-        <mc:AlternateContent xmlns:mc="http://schemas.openxmlformats.org/markup-compatibility/2006">
-          <mc:Choice xmlns:a14="http://schemas.microsoft.com/office/drawing/2010/main" Requires="a14">
+        <mc:AlternateContent xmlns:mc="http://schemas.openxmlformats.org/markup-compatibility/2006" xmlns:a14="http://schemas.microsoft.com/office/drawing/2010/main">
+          <mc:Choice Requires="a14">
             <p:sp>
               <p:nvSpPr>
                 <p:cNvPr id="55" name="Rectangle 54">
@@ -6288,7 +6251,7 @@
               </p:txBody>
             </p:sp>
           </mc:Choice>
-          <mc:Fallback>
+          <mc:Fallback xmlns="">
             <p:sp>
               <p:nvSpPr>
                 <p:cNvPr id="55" name="Rectangle 54">
@@ -6333,8 +6296,8 @@
             </p:sp>
           </mc:Fallback>
         </mc:AlternateContent>
-        <mc:AlternateContent xmlns:mc="http://schemas.openxmlformats.org/markup-compatibility/2006">
-          <mc:Choice xmlns:a14="http://schemas.microsoft.com/office/drawing/2010/main" Requires="a14">
+        <mc:AlternateContent xmlns:mc="http://schemas.openxmlformats.org/markup-compatibility/2006" xmlns:a14="http://schemas.microsoft.com/office/drawing/2010/main">
+          <mc:Choice Requires="a14">
             <p:sp>
               <p:nvSpPr>
                 <p:cNvPr id="56" name="Rectangle 55">
@@ -6408,7 +6371,7 @@
               </p:txBody>
             </p:sp>
           </mc:Choice>
-          <mc:Fallback>
+          <mc:Fallback xmlns="">
             <p:sp>
               <p:nvSpPr>
                 <p:cNvPr id="56" name="Rectangle 55">
@@ -6504,6 +6467,43 @@
           </a:p>
         </p:txBody>
       </p:sp>
+      <p:sp>
+        <p:nvSpPr>
+          <p:cNvPr id="5" name="TextBox 4">
+            <a:extLst>
+              <a:ext uri="{FF2B5EF4-FFF2-40B4-BE49-F238E27FC236}">
+                <a16:creationId xmlns:a16="http://schemas.microsoft.com/office/drawing/2014/main" id="{7BB0F56B-217E-60B8-BE8E-02DBFFDFD693}"/>
+              </a:ext>
+            </a:extLst>
+          </p:cNvPr>
+          <p:cNvSpPr txBox="1"/>
+          <p:nvPr/>
+        </p:nvSpPr>
+        <p:spPr>
+          <a:xfrm>
+            <a:off x="0" y="0"/>
+            <a:ext cx="11527184" cy="461665"/>
+          </a:xfrm>
+          <a:prstGeom prst="rect">
+            <a:avLst/>
+          </a:prstGeom>
+          <a:solidFill>
+            <a:schemeClr val="accent2"/>
+          </a:solidFill>
+        </p:spPr>
+        <p:txBody>
+          <a:bodyPr wrap="square" rtlCol="0">
+            <a:spAutoFit/>
+          </a:bodyPr>
+          <a:lstStyle/>
+          <a:p>
+            <a:r>
+              <a:rPr lang="en-US" sz="2400" b="1" dirty="0"/>
+              <a:t>Thermal power generators (in Thermo, “heat engines”)</a:t>
+            </a:r>
+          </a:p>
+        </p:txBody>
+      </p:sp>
     </p:spTree>
     <p:extLst>
       <p:ext uri="{BB962C8B-B14F-4D97-AF65-F5344CB8AC3E}">
@@ -6534,8 +6534,8 @@
           <a:chExt cx="0" cy="0"/>
         </a:xfrm>
       </p:grpSpPr>
-      <mc:AlternateContent xmlns:mc="http://schemas.openxmlformats.org/markup-compatibility/2006">
-        <mc:Choice xmlns:a14="http://schemas.microsoft.com/office/drawing/2010/main" Requires="a14">
+      <mc:AlternateContent xmlns:mc="http://schemas.openxmlformats.org/markup-compatibility/2006" xmlns:a14="http://schemas.microsoft.com/office/drawing/2010/main">
+        <mc:Choice Requires="a14">
           <p:sp>
             <p:nvSpPr>
               <p:cNvPr id="4" name="Rectangle 3">
@@ -7064,7 +7064,7 @@
             </p:txBody>
           </p:sp>
         </mc:Choice>
-        <mc:Fallback>
+        <mc:Fallback xmlns="">
           <p:sp>
             <p:nvSpPr>
               <p:cNvPr id="4" name="Rectangle 3">
@@ -7109,6 +7109,43 @@
           </p:sp>
         </mc:Fallback>
       </mc:AlternateContent>
+      <p:sp>
+        <p:nvSpPr>
+          <p:cNvPr id="2" name="TextBox 1">
+            <a:extLst>
+              <a:ext uri="{FF2B5EF4-FFF2-40B4-BE49-F238E27FC236}">
+                <a16:creationId xmlns:a16="http://schemas.microsoft.com/office/drawing/2014/main" id="{0DBA2816-DC48-2474-42F0-4AE0E63A3A2E}"/>
+              </a:ext>
+            </a:extLst>
+          </p:cNvPr>
+          <p:cNvSpPr txBox="1"/>
+          <p:nvPr/>
+        </p:nvSpPr>
+        <p:spPr>
+          <a:xfrm>
+            <a:off x="0" y="0"/>
+            <a:ext cx="11527184" cy="461665"/>
+          </a:xfrm>
+          <a:prstGeom prst="rect">
+            <a:avLst/>
+          </a:prstGeom>
+          <a:solidFill>
+            <a:schemeClr val="accent2"/>
+          </a:solidFill>
+        </p:spPr>
+        <p:txBody>
+          <a:bodyPr wrap="square" rtlCol="0">
+            <a:spAutoFit/>
+          </a:bodyPr>
+          <a:lstStyle/>
+          <a:p>
+            <a:r>
+              <a:rPr lang="en-US" sz="2400" b="1" dirty="0"/>
+              <a:t>Thermal power generators (in Thermo, “heat engines”)</a:t>
+            </a:r>
+          </a:p>
+        </p:txBody>
+      </p:sp>
     </p:spTree>
     <p:extLst>
       <p:ext uri="{BB962C8B-B14F-4D97-AF65-F5344CB8AC3E}">

</xml_diff>